<commit_message>
More updates. Rearranged folder. Added material.
</commit_message>
<xml_diff>
--- a/slides/4_preprocessing.pptx
+++ b/slides/4_preprocessing.pptx
@@ -292,7 +292,7 @@
           <a:p>
             <a:fld id="{900C2566-4675-0749-AB09-AD3F5B4B398D}" type="datetimeFigureOut">
               <a:rPr lang="en-US" smtClean="0"/>
-              <a:t>8/24/14</a:t>
+              <a:t>8/26/14</a:t>
             </a:fld>
             <a:endParaRPr lang="en-US"/>
           </a:p>
@@ -462,7 +462,7 @@
           <a:p>
             <a:fld id="{900C2566-4675-0749-AB09-AD3F5B4B398D}" type="datetimeFigureOut">
               <a:rPr lang="en-US" smtClean="0"/>
-              <a:t>8/24/14</a:t>
+              <a:t>8/26/14</a:t>
             </a:fld>
             <a:endParaRPr lang="en-US"/>
           </a:p>
@@ -642,7 +642,7 @@
           <a:p>
             <a:fld id="{900C2566-4675-0749-AB09-AD3F5B4B398D}" type="datetimeFigureOut">
               <a:rPr lang="en-US" smtClean="0"/>
-              <a:t>8/24/14</a:t>
+              <a:t>8/26/14</a:t>
             </a:fld>
             <a:endParaRPr lang="en-US"/>
           </a:p>
@@ -812,7 +812,7 @@
           <a:p>
             <a:fld id="{900C2566-4675-0749-AB09-AD3F5B4B398D}" type="datetimeFigureOut">
               <a:rPr lang="en-US" smtClean="0"/>
-              <a:t>8/24/14</a:t>
+              <a:t>8/26/14</a:t>
             </a:fld>
             <a:endParaRPr lang="en-US"/>
           </a:p>
@@ -1058,7 +1058,7 @@
           <a:p>
             <a:fld id="{900C2566-4675-0749-AB09-AD3F5B4B398D}" type="datetimeFigureOut">
               <a:rPr lang="en-US" smtClean="0"/>
-              <a:t>8/24/14</a:t>
+              <a:t>8/26/14</a:t>
             </a:fld>
             <a:endParaRPr lang="en-US"/>
           </a:p>
@@ -1346,7 +1346,7 @@
           <a:p>
             <a:fld id="{900C2566-4675-0749-AB09-AD3F5B4B398D}" type="datetimeFigureOut">
               <a:rPr lang="en-US" smtClean="0"/>
-              <a:t>8/24/14</a:t>
+              <a:t>8/26/14</a:t>
             </a:fld>
             <a:endParaRPr lang="en-US"/>
           </a:p>
@@ -1768,7 +1768,7 @@
           <a:p>
             <a:fld id="{900C2566-4675-0749-AB09-AD3F5B4B398D}" type="datetimeFigureOut">
               <a:rPr lang="en-US" smtClean="0"/>
-              <a:t>8/24/14</a:t>
+              <a:t>8/26/14</a:t>
             </a:fld>
             <a:endParaRPr lang="en-US"/>
           </a:p>
@@ -1886,7 +1886,7 @@
           <a:p>
             <a:fld id="{900C2566-4675-0749-AB09-AD3F5B4B398D}" type="datetimeFigureOut">
               <a:rPr lang="en-US" smtClean="0"/>
-              <a:t>8/24/14</a:t>
+              <a:t>8/26/14</a:t>
             </a:fld>
             <a:endParaRPr lang="en-US"/>
           </a:p>
@@ -1981,7 +1981,7 @@
           <a:p>
             <a:fld id="{900C2566-4675-0749-AB09-AD3F5B4B398D}" type="datetimeFigureOut">
               <a:rPr lang="en-US" smtClean="0"/>
-              <a:t>8/24/14</a:t>
+              <a:t>8/26/14</a:t>
             </a:fld>
             <a:endParaRPr lang="en-US"/>
           </a:p>
@@ -2258,7 +2258,7 @@
           <a:p>
             <a:fld id="{900C2566-4675-0749-AB09-AD3F5B4B398D}" type="datetimeFigureOut">
               <a:rPr lang="en-US" smtClean="0"/>
-              <a:t>8/24/14</a:t>
+              <a:t>8/26/14</a:t>
             </a:fld>
             <a:endParaRPr lang="en-US"/>
           </a:p>
@@ -2511,7 +2511,7 @@
           <a:p>
             <a:fld id="{900C2566-4675-0749-AB09-AD3F5B4B398D}" type="datetimeFigureOut">
               <a:rPr lang="en-US" smtClean="0"/>
-              <a:t>8/24/14</a:t>
+              <a:t>8/26/14</a:t>
             </a:fld>
             <a:endParaRPr lang="en-US"/>
           </a:p>
@@ -2724,7 +2724,7 @@
           <a:p>
             <a:fld id="{900C2566-4675-0749-AB09-AD3F5B4B398D}" type="datetimeFigureOut">
               <a:rPr lang="en-US" smtClean="0"/>
-              <a:t>8/24/14</a:t>
+              <a:t>8/26/14</a:t>
             </a:fld>
             <a:endParaRPr lang="en-US"/>
           </a:p>

</xml_diff>